<commit_message>
update edi3-model-interchange specifications pages
</commit_message>
<xml_diff>
--- a/specs/edi3-model-interchange/master/use-case.pptx
+++ b/specs/edi3-model-interchange/master/use-case.pptx
@@ -6,6 +6,7 @@
   </p:sldMasterIdLst>
   <p:sldIdLst>
     <p:sldId id="256" r:id="rId2"/>
+    <p:sldId id="257" r:id="rId3"/>
   </p:sldIdLst>
   <p:sldSz cx="9144000" cy="6858000" type="screen4x3"/>
   <p:notesSz cx="6858000" cy="9144000"/>
@@ -104,6 +105,11 @@
       </a:defRPr>
     </a:lvl9pPr>
   </p:defaultTextStyle>
+  <p:extLst>
+    <p:ext uri="{EFAFB233-063F-42B5-8137-9DF3F51BA10A}">
+      <p15:sldGuideLst xmlns:p15="http://schemas.microsoft.com/office/powerpoint/2012/main"/>
+    </p:ext>
+  </p:extLst>
 </p:presentation>
 </file>
 
@@ -238,7 +244,7 @@
           <a:p>
             <a:fld id="{155A5418-FB99-B64D-A890-7486D365ED54}" type="datetimeFigureOut">
               <a:rPr lang="en-US" smtClean="0"/>
-              <a:t>9/4/19</a:t>
+              <a:t>9/25/19</a:t>
             </a:fld>
             <a:endParaRPr lang="en-US"/>
           </a:p>
@@ -408,7 +414,7 @@
           <a:p>
             <a:fld id="{155A5418-FB99-B64D-A890-7486D365ED54}" type="datetimeFigureOut">
               <a:rPr lang="en-US" smtClean="0"/>
-              <a:t>9/4/19</a:t>
+              <a:t>9/25/19</a:t>
             </a:fld>
             <a:endParaRPr lang="en-US"/>
           </a:p>
@@ -588,7 +594,7 @@
           <a:p>
             <a:fld id="{155A5418-FB99-B64D-A890-7486D365ED54}" type="datetimeFigureOut">
               <a:rPr lang="en-US" smtClean="0"/>
-              <a:t>9/4/19</a:t>
+              <a:t>9/25/19</a:t>
             </a:fld>
             <a:endParaRPr lang="en-US"/>
           </a:p>
@@ -758,7 +764,7 @@
           <a:p>
             <a:fld id="{155A5418-FB99-B64D-A890-7486D365ED54}" type="datetimeFigureOut">
               <a:rPr lang="en-US" smtClean="0"/>
-              <a:t>9/4/19</a:t>
+              <a:t>9/25/19</a:t>
             </a:fld>
             <a:endParaRPr lang="en-US"/>
           </a:p>
@@ -1002,7 +1008,7 @@
           <a:p>
             <a:fld id="{155A5418-FB99-B64D-A890-7486D365ED54}" type="datetimeFigureOut">
               <a:rPr lang="en-US" smtClean="0"/>
-              <a:t>9/4/19</a:t>
+              <a:t>9/25/19</a:t>
             </a:fld>
             <a:endParaRPr lang="en-US"/>
           </a:p>
@@ -1234,7 +1240,7 @@
           <a:p>
             <a:fld id="{155A5418-FB99-B64D-A890-7486D365ED54}" type="datetimeFigureOut">
               <a:rPr lang="en-US" smtClean="0"/>
-              <a:t>9/4/19</a:t>
+              <a:t>9/25/19</a:t>
             </a:fld>
             <a:endParaRPr lang="en-US"/>
           </a:p>
@@ -1601,7 +1607,7 @@
           <a:p>
             <a:fld id="{155A5418-FB99-B64D-A890-7486D365ED54}" type="datetimeFigureOut">
               <a:rPr lang="en-US" smtClean="0"/>
-              <a:t>9/4/19</a:t>
+              <a:t>9/25/19</a:t>
             </a:fld>
             <a:endParaRPr lang="en-US"/>
           </a:p>
@@ -1719,7 +1725,7 @@
           <a:p>
             <a:fld id="{155A5418-FB99-B64D-A890-7486D365ED54}" type="datetimeFigureOut">
               <a:rPr lang="en-US" smtClean="0"/>
-              <a:t>9/4/19</a:t>
+              <a:t>9/25/19</a:t>
             </a:fld>
             <a:endParaRPr lang="en-US"/>
           </a:p>
@@ -1814,7 +1820,7 @@
           <a:p>
             <a:fld id="{155A5418-FB99-B64D-A890-7486D365ED54}" type="datetimeFigureOut">
               <a:rPr lang="en-US" smtClean="0"/>
-              <a:t>9/4/19</a:t>
+              <a:t>9/25/19</a:t>
             </a:fld>
             <a:endParaRPr lang="en-US"/>
           </a:p>
@@ -2091,7 +2097,7 @@
           <a:p>
             <a:fld id="{155A5418-FB99-B64D-A890-7486D365ED54}" type="datetimeFigureOut">
               <a:rPr lang="en-US" smtClean="0"/>
-              <a:t>9/4/19</a:t>
+              <a:t>9/25/19</a:t>
             </a:fld>
             <a:endParaRPr lang="en-US"/>
           </a:p>
@@ -2348,7 +2354,7 @@
           <a:p>
             <a:fld id="{155A5418-FB99-B64D-A890-7486D365ED54}" type="datetimeFigureOut">
               <a:rPr lang="en-US" smtClean="0"/>
-              <a:t>9/4/19</a:t>
+              <a:t>9/25/19</a:t>
             </a:fld>
             <a:endParaRPr lang="en-US"/>
           </a:p>
@@ -2561,7 +2567,7 @@
           <a:p>
             <a:fld id="{155A5418-FB99-B64D-A890-7486D365ED54}" type="datetimeFigureOut">
               <a:rPr lang="en-US" smtClean="0"/>
-              <a:t>9/4/19</a:t>
+              <a:t>9/25/19</a:t>
             </a:fld>
             <a:endParaRPr lang="en-US"/>
           </a:p>
@@ -2968,6 +2974,1089 @@
       </p:grpSpPr>
       <p:sp>
         <p:nvSpPr>
+          <p:cNvPr id="42" name="Can 41">
+            <a:extLst>
+              <a:ext uri="{FF2B5EF4-FFF2-40B4-BE49-F238E27FC236}">
+                <a16:creationId xmlns:a16="http://schemas.microsoft.com/office/drawing/2014/main" id="{8CE892E4-248E-4441-BE30-BEBE35D615BB}"/>
+              </a:ext>
+            </a:extLst>
+          </p:cNvPr>
+          <p:cNvSpPr/>
+          <p:nvPr/>
+        </p:nvSpPr>
+        <p:spPr>
+          <a:xfrm>
+            <a:off x="2989674" y="1838740"/>
+            <a:ext cx="2363548" cy="3766930"/>
+          </a:xfrm>
+          <a:prstGeom prst="can">
+            <a:avLst/>
+          </a:prstGeom>
+          <a:solidFill>
+            <a:schemeClr val="bg1">
+              <a:lumMod val="95000"/>
+            </a:schemeClr>
+          </a:solidFill>
+        </p:spPr>
+        <p:style>
+          <a:lnRef idx="2">
+            <a:schemeClr val="accent1">
+              <a:shade val="50000"/>
+            </a:schemeClr>
+          </a:lnRef>
+          <a:fillRef idx="1">
+            <a:schemeClr val="accent1"/>
+          </a:fillRef>
+          <a:effectRef idx="0">
+            <a:schemeClr val="accent1"/>
+          </a:effectRef>
+          <a:fontRef idx="minor">
+            <a:schemeClr val="lt1"/>
+          </a:fontRef>
+        </p:style>
+        <p:txBody>
+          <a:bodyPr rot="0" spcFirstLastPara="0" vertOverflow="overflow" horzOverflow="overflow" vert="horz" wrap="square" lIns="91440" tIns="45720" rIns="91440" bIns="45720" numCol="1" spcCol="0" rtlCol="0" fromWordArt="0" anchor="t" anchorCtr="0" forceAA="0" compatLnSpc="1">
+            <a:prstTxWarp prst="textNoShape">
+              <a:avLst/>
+            </a:prstTxWarp>
+            <a:noAutofit/>
+          </a:bodyPr>
+          <a:lstStyle/>
+          <a:p>
+            <a:pPr algn="ctr"/>
+            <a:r>
+              <a:rPr lang="en-US" sz="2400" b="1" dirty="0">
+                <a:solidFill>
+                  <a:schemeClr val="tx1"/>
+                </a:solidFill>
+              </a:rPr>
+              <a:t>Git</a:t>
+            </a:r>
+            <a:endParaRPr lang="en-US" sz="1400" dirty="0">
+              <a:solidFill>
+                <a:schemeClr val="tx1"/>
+              </a:solidFill>
+            </a:endParaRPr>
+          </a:p>
+          <a:p>
+            <a:pPr algn="ctr"/>
+            <a:r>
+              <a:rPr lang="en-US" sz="1400" dirty="0">
+                <a:solidFill>
+                  <a:schemeClr val="tx1"/>
+                </a:solidFill>
+              </a:rPr>
+              <a:t>Version control repository</a:t>
+            </a:r>
+          </a:p>
+        </p:txBody>
+      </p:sp>
+      <p:sp>
+        <p:nvSpPr>
+          <p:cNvPr id="83" name="Rounded Rectangle 82">
+            <a:extLst>
+              <a:ext uri="{FF2B5EF4-FFF2-40B4-BE49-F238E27FC236}">
+                <a16:creationId xmlns:a16="http://schemas.microsoft.com/office/drawing/2014/main" id="{543CA6C8-7D57-F84C-9A1B-B40B35C6CBBC}"/>
+              </a:ext>
+            </a:extLst>
+          </p:cNvPr>
+          <p:cNvSpPr/>
+          <p:nvPr/>
+        </p:nvSpPr>
+        <p:spPr>
+          <a:xfrm>
+            <a:off x="3299791" y="3170583"/>
+            <a:ext cx="1768121" cy="2222327"/>
+          </a:xfrm>
+          <a:prstGeom prst="roundRect">
+            <a:avLst>
+              <a:gd name="adj" fmla="val 7971"/>
+            </a:avLst>
+          </a:prstGeom>
+          <a:solidFill>
+            <a:schemeClr val="bg1"/>
+          </a:solidFill>
+        </p:spPr>
+        <p:style>
+          <a:lnRef idx="2">
+            <a:schemeClr val="accent1">
+              <a:shade val="50000"/>
+            </a:schemeClr>
+          </a:lnRef>
+          <a:fillRef idx="1">
+            <a:schemeClr val="accent1"/>
+          </a:fillRef>
+          <a:effectRef idx="0">
+            <a:schemeClr val="accent1"/>
+          </a:effectRef>
+          <a:fontRef idx="minor">
+            <a:schemeClr val="lt1"/>
+          </a:fontRef>
+        </p:style>
+        <p:txBody>
+          <a:bodyPr rtlCol="0" anchor="t"/>
+          <a:lstStyle/>
+          <a:p>
+            <a:pPr algn="ctr"/>
+            <a:r>
+              <a:rPr lang="en-US" sz="1400" dirty="0">
+                <a:solidFill>
+                  <a:schemeClr val="tx1"/>
+                </a:solidFill>
+              </a:rPr>
+              <a:t>Domain 1</a:t>
+            </a:r>
+          </a:p>
+        </p:txBody>
+      </p:sp>
+      <p:sp>
+        <p:nvSpPr>
+          <p:cNvPr id="67" name="Rounded Rectangle 66">
+            <a:extLst>
+              <a:ext uri="{FF2B5EF4-FFF2-40B4-BE49-F238E27FC236}">
+                <a16:creationId xmlns:a16="http://schemas.microsoft.com/office/drawing/2014/main" id="{E92A3301-DBFE-CF4C-9C0C-BCDFACB29E66}"/>
+              </a:ext>
+            </a:extLst>
+          </p:cNvPr>
+          <p:cNvSpPr/>
+          <p:nvPr/>
+        </p:nvSpPr>
+        <p:spPr>
+          <a:xfrm>
+            <a:off x="6828182" y="3737114"/>
+            <a:ext cx="1381540" cy="606292"/>
+          </a:xfrm>
+          <a:prstGeom prst="roundRect">
+            <a:avLst>
+              <a:gd name="adj" fmla="val 7971"/>
+            </a:avLst>
+          </a:prstGeom>
+          <a:solidFill>
+            <a:schemeClr val="accent5">
+              <a:lumMod val="20000"/>
+              <a:lumOff val="80000"/>
+            </a:schemeClr>
+          </a:solidFill>
+        </p:spPr>
+        <p:style>
+          <a:lnRef idx="2">
+            <a:schemeClr val="accent1">
+              <a:shade val="50000"/>
+            </a:schemeClr>
+          </a:lnRef>
+          <a:fillRef idx="1">
+            <a:schemeClr val="accent1"/>
+          </a:fillRef>
+          <a:effectRef idx="0">
+            <a:schemeClr val="accent1"/>
+          </a:effectRef>
+          <a:fontRef idx="minor">
+            <a:schemeClr val="lt1"/>
+          </a:fontRef>
+        </p:style>
+        <p:txBody>
+          <a:bodyPr rtlCol="0" anchor="t"/>
+          <a:lstStyle/>
+          <a:p>
+            <a:pPr algn="ctr"/>
+            <a:r>
+              <a:rPr lang="en-US" sz="1400" dirty="0">
+                <a:solidFill>
+                  <a:schemeClr val="tx1"/>
+                </a:solidFill>
+              </a:rPr>
+              <a:t>My preferred design tool B</a:t>
+            </a:r>
+          </a:p>
+        </p:txBody>
+      </p:sp>
+      <p:sp>
+        <p:nvSpPr>
+          <p:cNvPr id="39" name="Rounded Rectangle 38">
+            <a:extLst>
+              <a:ext uri="{FF2B5EF4-FFF2-40B4-BE49-F238E27FC236}">
+                <a16:creationId xmlns:a16="http://schemas.microsoft.com/office/drawing/2014/main" id="{B900F114-0D39-3144-A233-A89B3691572E}"/>
+              </a:ext>
+            </a:extLst>
+          </p:cNvPr>
+          <p:cNvSpPr/>
+          <p:nvPr/>
+        </p:nvSpPr>
+        <p:spPr>
+          <a:xfrm>
+            <a:off x="3473725" y="3558206"/>
+            <a:ext cx="1381540" cy="606292"/>
+          </a:xfrm>
+          <a:prstGeom prst="roundRect">
+            <a:avLst>
+              <a:gd name="adj" fmla="val 7971"/>
+            </a:avLst>
+          </a:prstGeom>
+          <a:solidFill>
+            <a:schemeClr val="bg1">
+              <a:lumMod val="75000"/>
+            </a:schemeClr>
+          </a:solidFill>
+        </p:spPr>
+        <p:style>
+          <a:lnRef idx="2">
+            <a:schemeClr val="accent1">
+              <a:shade val="50000"/>
+            </a:schemeClr>
+          </a:lnRef>
+          <a:fillRef idx="1">
+            <a:schemeClr val="accent1"/>
+          </a:fillRef>
+          <a:effectRef idx="0">
+            <a:schemeClr val="accent1"/>
+          </a:effectRef>
+          <a:fontRef idx="minor">
+            <a:schemeClr val="lt1"/>
+          </a:fontRef>
+        </p:style>
+        <p:txBody>
+          <a:bodyPr rtlCol="0" anchor="t"/>
+          <a:lstStyle/>
+          <a:p>
+            <a:pPr algn="ctr"/>
+            <a:r>
+              <a:rPr lang="en-US" sz="1400" dirty="0">
+                <a:solidFill>
+                  <a:schemeClr val="tx1"/>
+                </a:solidFill>
+              </a:rPr>
+              <a:t>Standard data models &amp; codes</a:t>
+            </a:r>
+          </a:p>
+        </p:txBody>
+      </p:sp>
+      <p:pic>
+        <p:nvPicPr>
+          <p:cNvPr id="3" name="Graphic 2" descr="User">
+            <a:extLst>
+              <a:ext uri="{FF2B5EF4-FFF2-40B4-BE49-F238E27FC236}">
+                <a16:creationId xmlns:a16="http://schemas.microsoft.com/office/drawing/2014/main" id="{BC36AF19-DA84-8A46-8B1C-F6C996E3F070}"/>
+              </a:ext>
+            </a:extLst>
+          </p:cNvPr>
+          <p:cNvPicPr>
+            <a:picLocks noChangeAspect="1"/>
+          </p:cNvPicPr>
+          <p:nvPr/>
+        </p:nvPicPr>
+        <p:blipFill>
+          <a:blip r:embed="rId2">
+            <a:extLst>
+              <a:ext uri="{96DAC541-7B7A-43D3-8B79-37D633B846F1}">
+                <asvg:svgBlip xmlns:asvg="http://schemas.microsoft.com/office/drawing/2016/SVG/main" r:embed="rId3"/>
+              </a:ext>
+            </a:extLst>
+          </a:blip>
+          <a:stretch>
+            <a:fillRect/>
+          </a:stretch>
+        </p:blipFill>
+        <p:spPr>
+          <a:xfrm>
+            <a:off x="6604552" y="2336905"/>
+            <a:ext cx="914400" cy="914400"/>
+          </a:xfrm>
+          <a:prstGeom prst="rect">
+            <a:avLst/>
+          </a:prstGeom>
+        </p:spPr>
+      </p:pic>
+      <p:cxnSp>
+        <p:nvCxnSpPr>
+          <p:cNvPr id="6" name="Straight Connector 5">
+            <a:extLst>
+              <a:ext uri="{FF2B5EF4-FFF2-40B4-BE49-F238E27FC236}">
+                <a16:creationId xmlns:a16="http://schemas.microsoft.com/office/drawing/2014/main" id="{9EF4F517-1F70-9042-959F-1682BC0A7AD0}"/>
+              </a:ext>
+            </a:extLst>
+          </p:cNvPr>
+          <p:cNvCxnSpPr>
+            <a:stCxn id="3" idx="2"/>
+            <a:endCxn id="46" idx="0"/>
+          </p:cNvCxnSpPr>
+          <p:nvPr/>
+        </p:nvCxnSpPr>
+        <p:spPr>
+          <a:xfrm>
+            <a:off x="7061752" y="3251305"/>
+            <a:ext cx="0" cy="306901"/>
+          </a:xfrm>
+          <a:prstGeom prst="line">
+            <a:avLst/>
+          </a:prstGeom>
+          <a:ln w="19050">
+            <a:solidFill>
+              <a:schemeClr val="tx1"/>
+            </a:solidFill>
+          </a:ln>
+        </p:spPr>
+        <p:style>
+          <a:lnRef idx="1">
+            <a:schemeClr val="accent1"/>
+          </a:lnRef>
+          <a:fillRef idx="0">
+            <a:schemeClr val="accent1"/>
+          </a:fillRef>
+          <a:effectRef idx="0">
+            <a:schemeClr val="accent1"/>
+          </a:effectRef>
+          <a:fontRef idx="minor">
+            <a:schemeClr val="tx1"/>
+          </a:fontRef>
+        </p:style>
+      </p:cxnSp>
+      <p:cxnSp>
+        <p:nvCxnSpPr>
+          <p:cNvPr id="27" name="Straight Arrow Connector 26">
+            <a:extLst>
+              <a:ext uri="{FF2B5EF4-FFF2-40B4-BE49-F238E27FC236}">
+                <a16:creationId xmlns:a16="http://schemas.microsoft.com/office/drawing/2014/main" id="{00CFE2C7-8182-0749-8D1B-EF8E62516422}"/>
+              </a:ext>
+            </a:extLst>
+          </p:cNvPr>
+          <p:cNvCxnSpPr>
+            <a:cxnSpLocks/>
+          </p:cNvCxnSpPr>
+          <p:nvPr/>
+        </p:nvCxnSpPr>
+        <p:spPr>
+          <a:xfrm>
+            <a:off x="4855265" y="3742082"/>
+            <a:ext cx="1515717" cy="0"/>
+          </a:xfrm>
+          <a:prstGeom prst="straightConnector1">
+            <a:avLst/>
+          </a:prstGeom>
+          <a:ln w="19050">
+            <a:solidFill>
+              <a:schemeClr val="tx1"/>
+            </a:solidFill>
+            <a:headEnd type="none" w="med" len="med"/>
+            <a:tailEnd type="arrow" w="med" len="med"/>
+          </a:ln>
+        </p:spPr>
+        <p:style>
+          <a:lnRef idx="1">
+            <a:schemeClr val="accent1"/>
+          </a:lnRef>
+          <a:fillRef idx="0">
+            <a:schemeClr val="accent1"/>
+          </a:fillRef>
+          <a:effectRef idx="0">
+            <a:schemeClr val="accent1"/>
+          </a:effectRef>
+          <a:fontRef idx="minor">
+            <a:schemeClr val="tx1"/>
+          </a:fontRef>
+        </p:style>
+      </p:cxnSp>
+      <p:cxnSp>
+        <p:nvCxnSpPr>
+          <p:cNvPr id="50" name="Straight Arrow Connector 49">
+            <a:extLst>
+              <a:ext uri="{FF2B5EF4-FFF2-40B4-BE49-F238E27FC236}">
+                <a16:creationId xmlns:a16="http://schemas.microsoft.com/office/drawing/2014/main" id="{F5EEE5C1-CB4E-6D44-B259-DAC68509C7F0}"/>
+              </a:ext>
+            </a:extLst>
+          </p:cNvPr>
+          <p:cNvCxnSpPr>
+            <a:cxnSpLocks/>
+          </p:cNvCxnSpPr>
+          <p:nvPr/>
+        </p:nvCxnSpPr>
+        <p:spPr>
+          <a:xfrm flipH="1">
+            <a:off x="4855265" y="4055167"/>
+            <a:ext cx="1515717" cy="0"/>
+          </a:xfrm>
+          <a:prstGeom prst="straightConnector1">
+            <a:avLst/>
+          </a:prstGeom>
+          <a:ln w="19050">
+            <a:solidFill>
+              <a:schemeClr val="tx1"/>
+            </a:solidFill>
+            <a:headEnd type="none" w="med" len="med"/>
+            <a:tailEnd type="arrow" w="med" len="med"/>
+          </a:ln>
+        </p:spPr>
+        <p:style>
+          <a:lnRef idx="1">
+            <a:schemeClr val="accent1"/>
+          </a:lnRef>
+          <a:fillRef idx="0">
+            <a:schemeClr val="accent1"/>
+          </a:fillRef>
+          <a:effectRef idx="0">
+            <a:schemeClr val="accent1"/>
+          </a:effectRef>
+          <a:fontRef idx="minor">
+            <a:schemeClr val="tx1"/>
+          </a:fontRef>
+        </p:style>
+      </p:cxnSp>
+      <p:sp>
+        <p:nvSpPr>
+          <p:cNvPr id="32" name="TextBox 31">
+            <a:extLst>
+              <a:ext uri="{FF2B5EF4-FFF2-40B4-BE49-F238E27FC236}">
+                <a16:creationId xmlns:a16="http://schemas.microsoft.com/office/drawing/2014/main" id="{BBC3DB3D-932D-DD44-8DB9-914869B313A1}"/>
+              </a:ext>
+            </a:extLst>
+          </p:cNvPr>
+          <p:cNvSpPr txBox="1"/>
+          <p:nvPr/>
+        </p:nvSpPr>
+        <p:spPr>
+          <a:xfrm>
+            <a:off x="5059978" y="4040260"/>
+            <a:ext cx="1240468" cy="276999"/>
+          </a:xfrm>
+          <a:prstGeom prst="rect">
+            <a:avLst/>
+          </a:prstGeom>
+          <a:noFill/>
+        </p:spPr>
+        <p:txBody>
+          <a:bodyPr wrap="square" rtlCol="0">
+            <a:spAutoFit/>
+          </a:bodyPr>
+          <a:lstStyle/>
+          <a:p>
+            <a:r>
+              <a:rPr lang="en-US" sz="1200" dirty="0"/>
+              <a:t>Propose changes</a:t>
+            </a:r>
+          </a:p>
+        </p:txBody>
+      </p:sp>
+      <p:sp>
+        <p:nvSpPr>
+          <p:cNvPr id="63" name="TextBox 62">
+            <a:extLst>
+              <a:ext uri="{FF2B5EF4-FFF2-40B4-BE49-F238E27FC236}">
+                <a16:creationId xmlns:a16="http://schemas.microsoft.com/office/drawing/2014/main" id="{02625043-E279-D045-BFD0-7CF64AD14F6F}"/>
+              </a:ext>
+            </a:extLst>
+          </p:cNvPr>
+          <p:cNvSpPr txBox="1"/>
+          <p:nvPr/>
+        </p:nvSpPr>
+        <p:spPr>
+          <a:xfrm>
+            <a:off x="5059978" y="3475673"/>
+            <a:ext cx="1240468" cy="276999"/>
+          </a:xfrm>
+          <a:prstGeom prst="rect">
+            <a:avLst/>
+          </a:prstGeom>
+          <a:noFill/>
+        </p:spPr>
+        <p:txBody>
+          <a:bodyPr wrap="square" rtlCol="0">
+            <a:spAutoFit/>
+          </a:bodyPr>
+          <a:lstStyle/>
+          <a:p>
+            <a:r>
+              <a:rPr lang="en-US" sz="1200" dirty="0"/>
+              <a:t>Sync Standards</a:t>
+            </a:r>
+          </a:p>
+        </p:txBody>
+      </p:sp>
+      <p:sp>
+        <p:nvSpPr>
+          <p:cNvPr id="64" name="TextBox 63">
+            <a:extLst>
+              <a:ext uri="{FF2B5EF4-FFF2-40B4-BE49-F238E27FC236}">
+                <a16:creationId xmlns:a16="http://schemas.microsoft.com/office/drawing/2014/main" id="{61D4B44A-43FB-8C40-B756-71C10F4914A6}"/>
+              </a:ext>
+            </a:extLst>
+          </p:cNvPr>
+          <p:cNvSpPr txBox="1"/>
+          <p:nvPr/>
+        </p:nvSpPr>
+        <p:spPr>
+          <a:xfrm>
+            <a:off x="6559746" y="1948256"/>
+            <a:ext cx="1620159" cy="523220"/>
+          </a:xfrm>
+          <a:prstGeom prst="rect">
+            <a:avLst/>
+          </a:prstGeom>
+          <a:noFill/>
+        </p:spPr>
+        <p:txBody>
+          <a:bodyPr wrap="square" rtlCol="0">
+            <a:spAutoFit/>
+          </a:bodyPr>
+          <a:lstStyle/>
+          <a:p>
+            <a:r>
+              <a:rPr lang="en-US" sz="1400" dirty="0"/>
+              <a:t>Domain Subject Matter Experts</a:t>
+            </a:r>
+          </a:p>
+        </p:txBody>
+      </p:sp>
+      <p:pic>
+        <p:nvPicPr>
+          <p:cNvPr id="66" name="Graphic 65" descr="User">
+            <a:extLst>
+              <a:ext uri="{FF2B5EF4-FFF2-40B4-BE49-F238E27FC236}">
+                <a16:creationId xmlns:a16="http://schemas.microsoft.com/office/drawing/2014/main" id="{FE73D6FB-0F51-264F-986E-34C35B26C4C9}"/>
+              </a:ext>
+            </a:extLst>
+          </p:cNvPr>
+          <p:cNvPicPr>
+            <a:picLocks noChangeAspect="1"/>
+          </p:cNvPicPr>
+          <p:nvPr/>
+        </p:nvPicPr>
+        <p:blipFill>
+          <a:blip r:embed="rId2">
+            <a:extLst>
+              <a:ext uri="{96DAC541-7B7A-43D3-8B79-37D633B846F1}">
+                <asvg:svgBlip xmlns:asvg="http://schemas.microsoft.com/office/drawing/2016/SVG/main" r:embed="rId3"/>
+              </a:ext>
+            </a:extLst>
+          </a:blip>
+          <a:stretch>
+            <a:fillRect/>
+          </a:stretch>
+        </p:blipFill>
+        <p:spPr>
+          <a:xfrm>
+            <a:off x="7061752" y="2546591"/>
+            <a:ext cx="914400" cy="914400"/>
+          </a:xfrm>
+          <a:prstGeom prst="rect">
+            <a:avLst/>
+          </a:prstGeom>
+        </p:spPr>
+      </p:pic>
+      <p:cxnSp>
+        <p:nvCxnSpPr>
+          <p:cNvPr id="68" name="Straight Connector 67">
+            <a:extLst>
+              <a:ext uri="{FF2B5EF4-FFF2-40B4-BE49-F238E27FC236}">
+                <a16:creationId xmlns:a16="http://schemas.microsoft.com/office/drawing/2014/main" id="{107BC889-41F4-7B47-A6B8-2C8499149190}"/>
+              </a:ext>
+            </a:extLst>
+          </p:cNvPr>
+          <p:cNvCxnSpPr>
+            <a:cxnSpLocks/>
+            <a:stCxn id="66" idx="2"/>
+            <a:endCxn id="67" idx="0"/>
+          </p:cNvCxnSpPr>
+          <p:nvPr/>
+        </p:nvCxnSpPr>
+        <p:spPr>
+          <a:xfrm>
+            <a:off x="7518952" y="3460991"/>
+            <a:ext cx="0" cy="276123"/>
+          </a:xfrm>
+          <a:prstGeom prst="line">
+            <a:avLst/>
+          </a:prstGeom>
+          <a:ln w="19050">
+            <a:solidFill>
+              <a:schemeClr val="tx1"/>
+            </a:solidFill>
+          </a:ln>
+        </p:spPr>
+        <p:style>
+          <a:lnRef idx="1">
+            <a:schemeClr val="accent1"/>
+          </a:lnRef>
+          <a:fillRef idx="0">
+            <a:schemeClr val="accent1"/>
+          </a:fillRef>
+          <a:effectRef idx="0">
+            <a:schemeClr val="accent1"/>
+          </a:effectRef>
+          <a:fontRef idx="minor">
+            <a:schemeClr val="tx1"/>
+          </a:fontRef>
+        </p:style>
+      </p:cxnSp>
+      <p:sp>
+        <p:nvSpPr>
+          <p:cNvPr id="46" name="Rounded Rectangle 45">
+            <a:extLst>
+              <a:ext uri="{FF2B5EF4-FFF2-40B4-BE49-F238E27FC236}">
+                <a16:creationId xmlns:a16="http://schemas.microsoft.com/office/drawing/2014/main" id="{A002C7D5-A640-9043-8E2C-95FE61BC8AB1}"/>
+              </a:ext>
+            </a:extLst>
+          </p:cNvPr>
+          <p:cNvSpPr/>
+          <p:nvPr/>
+        </p:nvSpPr>
+        <p:spPr>
+          <a:xfrm>
+            <a:off x="6370982" y="3558206"/>
+            <a:ext cx="1381540" cy="606292"/>
+          </a:xfrm>
+          <a:prstGeom prst="roundRect">
+            <a:avLst>
+              <a:gd name="adj" fmla="val 7971"/>
+            </a:avLst>
+          </a:prstGeom>
+          <a:solidFill>
+            <a:schemeClr val="accent4">
+              <a:lumMod val="20000"/>
+              <a:lumOff val="80000"/>
+            </a:schemeClr>
+          </a:solidFill>
+        </p:spPr>
+        <p:style>
+          <a:lnRef idx="2">
+            <a:schemeClr val="accent1">
+              <a:shade val="50000"/>
+            </a:schemeClr>
+          </a:lnRef>
+          <a:fillRef idx="1">
+            <a:schemeClr val="accent1"/>
+          </a:fillRef>
+          <a:effectRef idx="0">
+            <a:schemeClr val="accent1"/>
+          </a:effectRef>
+          <a:fontRef idx="minor">
+            <a:schemeClr val="lt1"/>
+          </a:fontRef>
+        </p:style>
+        <p:txBody>
+          <a:bodyPr rtlCol="0" anchor="t"/>
+          <a:lstStyle/>
+          <a:p>
+            <a:pPr algn="ctr"/>
+            <a:r>
+              <a:rPr lang="en-US" sz="1400" dirty="0">
+                <a:solidFill>
+                  <a:schemeClr val="tx1"/>
+                </a:solidFill>
+              </a:rPr>
+              <a:t>My preferred design tool A</a:t>
+            </a:r>
+          </a:p>
+        </p:txBody>
+      </p:sp>
+      <p:pic>
+        <p:nvPicPr>
+          <p:cNvPr id="69" name="Graphic 68" descr="User">
+            <a:extLst>
+              <a:ext uri="{FF2B5EF4-FFF2-40B4-BE49-F238E27FC236}">
+                <a16:creationId xmlns:a16="http://schemas.microsoft.com/office/drawing/2014/main" id="{2C94C691-B4ED-BB45-8538-A85E9795FC10}"/>
+              </a:ext>
+            </a:extLst>
+          </p:cNvPr>
+          <p:cNvPicPr>
+            <a:picLocks noChangeAspect="1"/>
+          </p:cNvPicPr>
+          <p:nvPr/>
+        </p:nvPicPr>
+        <p:blipFill>
+          <a:blip r:embed="rId2">
+            <a:extLst>
+              <a:ext uri="{96DAC541-7B7A-43D3-8B79-37D633B846F1}">
+                <asvg:svgBlip xmlns:asvg="http://schemas.microsoft.com/office/drawing/2016/SVG/main" r:embed="rId3"/>
+              </a:ext>
+            </a:extLst>
+          </a:blip>
+          <a:stretch>
+            <a:fillRect/>
+          </a:stretch>
+        </p:blipFill>
+        <p:spPr>
+          <a:xfrm>
+            <a:off x="1547538" y="2346724"/>
+            <a:ext cx="914400" cy="914400"/>
+          </a:xfrm>
+          <a:prstGeom prst="rect">
+            <a:avLst/>
+          </a:prstGeom>
+        </p:spPr>
+      </p:pic>
+      <p:sp>
+        <p:nvSpPr>
+          <p:cNvPr id="70" name="TextBox 69">
+            <a:extLst>
+              <a:ext uri="{FF2B5EF4-FFF2-40B4-BE49-F238E27FC236}">
+                <a16:creationId xmlns:a16="http://schemas.microsoft.com/office/drawing/2014/main" id="{7E764D71-5DAC-4941-B795-BEFBB7B2DEA2}"/>
+              </a:ext>
+            </a:extLst>
+          </p:cNvPr>
+          <p:cNvSpPr txBox="1"/>
+          <p:nvPr/>
+        </p:nvSpPr>
+        <p:spPr>
+          <a:xfrm>
+            <a:off x="1374834" y="1911370"/>
+            <a:ext cx="1338550" cy="523220"/>
+          </a:xfrm>
+          <a:prstGeom prst="rect">
+            <a:avLst/>
+          </a:prstGeom>
+          <a:noFill/>
+        </p:spPr>
+        <p:txBody>
+          <a:bodyPr wrap="square" rtlCol="0">
+            <a:spAutoFit/>
+          </a:bodyPr>
+          <a:lstStyle/>
+          <a:p>
+            <a:pPr algn="ctr"/>
+            <a:r>
+              <a:rPr lang="en-US" sz="1400" dirty="0"/>
+              <a:t>Domain Coordinator</a:t>
+            </a:r>
+          </a:p>
+        </p:txBody>
+      </p:sp>
+      <p:cxnSp>
+        <p:nvCxnSpPr>
+          <p:cNvPr id="71" name="Straight Arrow Connector 70">
+            <a:extLst>
+              <a:ext uri="{FF2B5EF4-FFF2-40B4-BE49-F238E27FC236}">
+                <a16:creationId xmlns:a16="http://schemas.microsoft.com/office/drawing/2014/main" id="{46F8B7AB-0F7C-B54C-B586-2E9CCB87E34B}"/>
+              </a:ext>
+            </a:extLst>
+          </p:cNvPr>
+          <p:cNvCxnSpPr>
+            <a:cxnSpLocks/>
+            <a:stCxn id="69" idx="2"/>
+            <a:endCxn id="39" idx="1"/>
+          </p:cNvCxnSpPr>
+          <p:nvPr/>
+        </p:nvCxnSpPr>
+        <p:spPr>
+          <a:xfrm rot="16200000" flipH="1">
+            <a:off x="2439117" y="2826744"/>
+            <a:ext cx="600228" cy="1468987"/>
+          </a:xfrm>
+          <a:prstGeom prst="bentConnector2">
+            <a:avLst/>
+          </a:prstGeom>
+          <a:ln w="19050">
+            <a:solidFill>
+              <a:schemeClr val="tx1"/>
+            </a:solidFill>
+            <a:headEnd type="none" w="med" len="med"/>
+            <a:tailEnd type="arrow" w="med" len="med"/>
+          </a:ln>
+        </p:spPr>
+        <p:style>
+          <a:lnRef idx="1">
+            <a:schemeClr val="accent1"/>
+          </a:lnRef>
+          <a:fillRef idx="0">
+            <a:schemeClr val="accent1"/>
+          </a:fillRef>
+          <a:effectRef idx="0">
+            <a:schemeClr val="accent1"/>
+          </a:effectRef>
+          <a:fontRef idx="minor">
+            <a:schemeClr val="tx1"/>
+          </a:fontRef>
+        </p:style>
+      </p:cxnSp>
+      <p:sp>
+        <p:nvSpPr>
+          <p:cNvPr id="73" name="TextBox 72">
+            <a:extLst>
+              <a:ext uri="{FF2B5EF4-FFF2-40B4-BE49-F238E27FC236}">
+                <a16:creationId xmlns:a16="http://schemas.microsoft.com/office/drawing/2014/main" id="{8E81B3E7-ADE5-4C41-BFF7-F5CDCBEB22BB}"/>
+              </a:ext>
+            </a:extLst>
+          </p:cNvPr>
+          <p:cNvSpPr txBox="1"/>
+          <p:nvPr/>
+        </p:nvSpPr>
+        <p:spPr>
+          <a:xfrm>
+            <a:off x="2032030" y="3614172"/>
+            <a:ext cx="1240468" cy="646331"/>
+          </a:xfrm>
+          <a:prstGeom prst="rect">
+            <a:avLst/>
+          </a:prstGeom>
+          <a:noFill/>
+        </p:spPr>
+        <p:txBody>
+          <a:bodyPr wrap="square" rtlCol="0">
+            <a:spAutoFit/>
+          </a:bodyPr>
+          <a:lstStyle/>
+          <a:p>
+            <a:r>
+              <a:rPr lang="en-US" sz="1200" dirty="0"/>
+              <a:t>Review &amp; accept/reject proposals</a:t>
+            </a:r>
+          </a:p>
+        </p:txBody>
+      </p:sp>
+      <p:sp>
+        <p:nvSpPr>
+          <p:cNvPr id="74" name="Rounded Rectangle 73">
+            <a:extLst>
+              <a:ext uri="{FF2B5EF4-FFF2-40B4-BE49-F238E27FC236}">
+                <a16:creationId xmlns:a16="http://schemas.microsoft.com/office/drawing/2014/main" id="{A06CA5B6-5FBB-344B-B77D-646EED210CDF}"/>
+              </a:ext>
+            </a:extLst>
+          </p:cNvPr>
+          <p:cNvSpPr/>
+          <p:nvPr/>
+        </p:nvSpPr>
+        <p:spPr>
+          <a:xfrm>
+            <a:off x="3481660" y="4634218"/>
+            <a:ext cx="1381540" cy="606292"/>
+          </a:xfrm>
+          <a:prstGeom prst="roundRect">
+            <a:avLst>
+              <a:gd name="adj" fmla="val 7971"/>
+            </a:avLst>
+          </a:prstGeom>
+          <a:solidFill>
+            <a:schemeClr val="bg1">
+              <a:lumMod val="75000"/>
+            </a:schemeClr>
+          </a:solidFill>
+        </p:spPr>
+        <p:style>
+          <a:lnRef idx="2">
+            <a:schemeClr val="accent1">
+              <a:shade val="50000"/>
+            </a:schemeClr>
+          </a:lnRef>
+          <a:fillRef idx="1">
+            <a:schemeClr val="accent1"/>
+          </a:fillRef>
+          <a:effectRef idx="0">
+            <a:schemeClr val="accent1"/>
+          </a:effectRef>
+          <a:fontRef idx="minor">
+            <a:schemeClr val="lt1"/>
+          </a:fontRef>
+        </p:style>
+        <p:txBody>
+          <a:bodyPr rtlCol="0" anchor="t"/>
+          <a:lstStyle/>
+          <a:p>
+            <a:pPr algn="ctr"/>
+            <a:r>
+              <a:rPr lang="en-US" sz="1400" dirty="0">
+                <a:solidFill>
+                  <a:schemeClr val="tx1"/>
+                </a:solidFill>
+              </a:rPr>
+              <a:t>Other useful outputs</a:t>
+            </a:r>
+          </a:p>
+        </p:txBody>
+      </p:sp>
+      <p:cxnSp>
+        <p:nvCxnSpPr>
+          <p:cNvPr id="75" name="Straight Arrow Connector 74">
+            <a:extLst>
+              <a:ext uri="{FF2B5EF4-FFF2-40B4-BE49-F238E27FC236}">
+                <a16:creationId xmlns:a16="http://schemas.microsoft.com/office/drawing/2014/main" id="{5F350515-55EF-544C-8ECD-A1C6978BF428}"/>
+              </a:ext>
+            </a:extLst>
+          </p:cNvPr>
+          <p:cNvCxnSpPr>
+            <a:cxnSpLocks/>
+            <a:stCxn id="39" idx="2"/>
+            <a:endCxn id="74" idx="0"/>
+          </p:cNvCxnSpPr>
+          <p:nvPr/>
+        </p:nvCxnSpPr>
+        <p:spPr>
+          <a:xfrm>
+            <a:off x="4164495" y="4164498"/>
+            <a:ext cx="7935" cy="469720"/>
+          </a:xfrm>
+          <a:prstGeom prst="straightConnector1">
+            <a:avLst/>
+          </a:prstGeom>
+          <a:ln w="19050">
+            <a:solidFill>
+              <a:schemeClr val="tx1"/>
+            </a:solidFill>
+            <a:headEnd type="none" w="med" len="med"/>
+            <a:tailEnd type="arrow" w="med" len="med"/>
+          </a:ln>
+        </p:spPr>
+        <p:style>
+          <a:lnRef idx="1">
+            <a:schemeClr val="accent1"/>
+          </a:lnRef>
+          <a:fillRef idx="0">
+            <a:schemeClr val="accent1"/>
+          </a:fillRef>
+          <a:effectRef idx="0">
+            <a:schemeClr val="accent1"/>
+          </a:effectRef>
+          <a:fontRef idx="minor">
+            <a:schemeClr val="tx1"/>
+          </a:fontRef>
+        </p:style>
+      </p:cxnSp>
+      <p:sp>
+        <p:nvSpPr>
+          <p:cNvPr id="78" name="TextBox 77">
+            <a:extLst>
+              <a:ext uri="{FF2B5EF4-FFF2-40B4-BE49-F238E27FC236}">
+                <a16:creationId xmlns:a16="http://schemas.microsoft.com/office/drawing/2014/main" id="{5D21E795-C33C-A14F-97B3-DA03162CD91C}"/>
+              </a:ext>
+            </a:extLst>
+          </p:cNvPr>
+          <p:cNvSpPr txBox="1"/>
+          <p:nvPr/>
+        </p:nvSpPr>
+        <p:spPr>
+          <a:xfrm>
+            <a:off x="4155517" y="4269059"/>
+            <a:ext cx="793166" cy="276999"/>
+          </a:xfrm>
+          <a:prstGeom prst="rect">
+            <a:avLst/>
+          </a:prstGeom>
+          <a:noFill/>
+        </p:spPr>
+        <p:txBody>
+          <a:bodyPr wrap="square" rtlCol="0">
+            <a:spAutoFit/>
+          </a:bodyPr>
+          <a:lstStyle/>
+          <a:p>
+            <a:r>
+              <a:rPr lang="en-US" sz="1200" dirty="0"/>
+              <a:t>Verify</a:t>
+            </a:r>
+          </a:p>
+        </p:txBody>
+      </p:sp>
+      <p:cxnSp>
+        <p:nvCxnSpPr>
+          <p:cNvPr id="79" name="Straight Arrow Connector 70">
+            <a:extLst>
+              <a:ext uri="{FF2B5EF4-FFF2-40B4-BE49-F238E27FC236}">
+                <a16:creationId xmlns:a16="http://schemas.microsoft.com/office/drawing/2014/main" id="{B450821D-C74A-3E48-AB3B-25676A160376}"/>
+              </a:ext>
+            </a:extLst>
+          </p:cNvPr>
+          <p:cNvCxnSpPr>
+            <a:cxnSpLocks/>
+            <a:stCxn id="46" idx="2"/>
+            <a:endCxn id="74" idx="3"/>
+          </p:cNvCxnSpPr>
+          <p:nvPr/>
+        </p:nvCxnSpPr>
+        <p:spPr>
+          <a:xfrm rot="5400000">
+            <a:off x="5576043" y="3451655"/>
+            <a:ext cx="772866" cy="2198552"/>
+          </a:xfrm>
+          <a:prstGeom prst="bentConnector2">
+            <a:avLst/>
+          </a:prstGeom>
+          <a:ln w="19050">
+            <a:solidFill>
+              <a:schemeClr val="tx1"/>
+            </a:solidFill>
+            <a:headEnd type="none" w="med" len="med"/>
+            <a:tailEnd type="arrow" w="med" len="med"/>
+          </a:ln>
+        </p:spPr>
+        <p:style>
+          <a:lnRef idx="1">
+            <a:schemeClr val="accent1"/>
+          </a:lnRef>
+          <a:fillRef idx="0">
+            <a:schemeClr val="accent1"/>
+          </a:fillRef>
+          <a:effectRef idx="0">
+            <a:schemeClr val="accent1"/>
+          </a:effectRef>
+          <a:fontRef idx="minor">
+            <a:schemeClr val="tx1"/>
+          </a:fontRef>
+        </p:style>
+      </p:cxnSp>
+      <p:sp>
+        <p:nvSpPr>
+          <p:cNvPr id="82" name="TextBox 81">
+            <a:extLst>
+              <a:ext uri="{FF2B5EF4-FFF2-40B4-BE49-F238E27FC236}">
+                <a16:creationId xmlns:a16="http://schemas.microsoft.com/office/drawing/2014/main" id="{758B2C3E-6817-5043-9563-D3274EF05FD9}"/>
+              </a:ext>
+            </a:extLst>
+          </p:cNvPr>
+          <p:cNvSpPr txBox="1"/>
+          <p:nvPr/>
+        </p:nvSpPr>
+        <p:spPr>
+          <a:xfrm>
+            <a:off x="5680212" y="4685017"/>
+            <a:ext cx="793166" cy="276999"/>
+          </a:xfrm>
+          <a:prstGeom prst="rect">
+            <a:avLst/>
+          </a:prstGeom>
+          <a:noFill/>
+        </p:spPr>
+        <p:txBody>
+          <a:bodyPr wrap="square" rtlCol="0">
+            <a:spAutoFit/>
+          </a:bodyPr>
+          <a:lstStyle/>
+          <a:p>
+            <a:r>
+              <a:rPr lang="en-US" sz="1200" dirty="0"/>
+              <a:t>Generate</a:t>
+            </a:r>
+          </a:p>
+        </p:txBody>
+      </p:sp>
+    </p:spTree>
+    <p:extLst>
+      <p:ext uri="{BB962C8B-B14F-4D97-AF65-F5344CB8AC3E}">
+        <p14:creationId xmlns:p14="http://schemas.microsoft.com/office/powerpoint/2010/main" val="2858432016"/>
+      </p:ext>
+    </p:extLst>
+  </p:cSld>
+  <p:clrMapOvr>
+    <a:masterClrMapping/>
+  </p:clrMapOvr>
+</p:sld>
+</file>
+
+<file path=ppt/slides/slide2.xml><?xml version="1.0" encoding="utf-8"?>
+<p:sld xmlns:a="http://schemas.openxmlformats.org/drawingml/2006/main" xmlns:r="http://schemas.openxmlformats.org/officeDocument/2006/relationships" xmlns:p="http://schemas.openxmlformats.org/presentationml/2006/main">
+  <p:cSld>
+    <p:spTree>
+      <p:nvGrpSpPr>
+        <p:cNvPr id="1" name=""/>
+        <p:cNvGrpSpPr/>
+        <p:nvPr/>
+      </p:nvGrpSpPr>
+      <p:grpSpPr>
+        <a:xfrm>
+          <a:off x="0" y="0"/>
+          <a:ext cx="0" cy="0"/>
+          <a:chOff x="0" y="0"/>
+          <a:chExt cx="0" cy="0"/>
+        </a:xfrm>
+      </p:grpSpPr>
+      <p:sp>
+        <p:nvSpPr>
           <p:cNvPr id="61" name="Rounded Rectangle 60">
             <a:extLst>
               <a:ext uri="{FF2B5EF4-FFF2-40B4-BE49-F238E27FC236}">
@@ -3024,6 +4113,36 @@
               <a:t>edi3.org GitHub</a:t>
             </a:r>
           </a:p>
+          <a:p>
+            <a:pPr algn="ctr"/>
+            <a:r>
+              <a:rPr lang="en-US" sz="1400" dirty="0">
+                <a:solidFill>
+                  <a:schemeClr val="tx1"/>
+                </a:solidFill>
+              </a:rPr>
+              <a:t>Or</a:t>
+            </a:r>
+          </a:p>
+          <a:p>
+            <a:pPr algn="ctr"/>
+            <a:r>
+              <a:rPr lang="en-US" sz="1400" dirty="0" err="1">
+                <a:solidFill>
+                  <a:schemeClr val="tx1"/>
+                </a:solidFill>
+              </a:rPr>
+              <a:t>git.un.org</a:t>
+            </a:r>
+            <a:r>
+              <a:rPr lang="en-US" sz="1400" dirty="0">
+                <a:solidFill>
+                  <a:schemeClr val="tx1"/>
+                </a:solidFill>
+              </a:rPr>
+              <a:t> GitLab</a:t>
+            </a:r>
+          </a:p>
         </p:txBody>
       </p:sp>
       <p:sp>
@@ -3100,7 +4219,7 @@
         </p:nvSpPr>
         <p:spPr>
           <a:xfrm>
-            <a:off x="2524538" y="2474842"/>
+            <a:off x="2524538" y="3101003"/>
             <a:ext cx="1930493" cy="2949241"/>
           </a:xfrm>
           <a:prstGeom prst="roundRect">
@@ -3160,7 +4279,7 @@
         </p:nvSpPr>
         <p:spPr>
           <a:xfrm>
-            <a:off x="2854832" y="2859784"/>
+            <a:off x="2854832" y="3485945"/>
             <a:ext cx="1242391" cy="576469"/>
           </a:xfrm>
           <a:prstGeom prst="roundRect">
@@ -3225,7 +4344,7 @@
         </p:nvSpPr>
         <p:spPr>
           <a:xfrm>
-            <a:off x="2854832" y="3618473"/>
+            <a:off x="2854832" y="4244634"/>
             <a:ext cx="1242391" cy="576469"/>
           </a:xfrm>
           <a:prstGeom prst="roundRect">
@@ -3290,7 +4409,7 @@
         </p:nvSpPr>
         <p:spPr>
           <a:xfrm>
-            <a:off x="2854832" y="4514655"/>
+            <a:off x="2854832" y="5140816"/>
             <a:ext cx="1242391" cy="576469"/>
           </a:xfrm>
           <a:prstGeom prst="roundRect">
@@ -3355,7 +4474,7 @@
         </p:nvSpPr>
         <p:spPr>
           <a:xfrm>
-            <a:off x="2758753" y="3759278"/>
+            <a:off x="2758753" y="4385439"/>
             <a:ext cx="1242391" cy="576469"/>
           </a:xfrm>
           <a:prstGeom prst="roundRect">
@@ -3420,7 +4539,7 @@
         </p:nvSpPr>
         <p:spPr>
           <a:xfrm>
-            <a:off x="2718996" y="4648833"/>
+            <a:off x="2718996" y="5274994"/>
             <a:ext cx="1242391" cy="576469"/>
           </a:xfrm>
           <a:prstGeom prst="roundRect">
@@ -3485,8 +4604,8 @@
         </p:nvSpPr>
         <p:spPr>
           <a:xfrm>
-            <a:off x="2919434" y="3341831"/>
-            <a:ext cx="921027" cy="188843"/>
+            <a:off x="2774997" y="3976903"/>
+            <a:ext cx="1263376" cy="182221"/>
           </a:xfrm>
           <a:prstGeom prst="roundRect">
             <a:avLst>
@@ -3532,7 +4651,7 @@
                   <a:schemeClr val="bg1"/>
                 </a:solidFill>
               </a:rPr>
-              <a:t>Arch repo</a:t>
+              <a:t>Architecture  repo</a:t>
             </a:r>
           </a:p>
         </p:txBody>
@@ -3551,7 +4670,7 @@
         </p:nvSpPr>
         <p:spPr>
           <a:xfrm>
-            <a:off x="2815073" y="4218956"/>
+            <a:off x="2815073" y="4845117"/>
             <a:ext cx="934279" cy="216181"/>
           </a:xfrm>
           <a:prstGeom prst="roundRect">
@@ -3612,7 +4731,7 @@
         </p:nvSpPr>
         <p:spPr>
           <a:xfrm>
-            <a:off x="2791881" y="5130880"/>
+            <a:off x="2791881" y="5757041"/>
             <a:ext cx="921027" cy="188843"/>
           </a:xfrm>
           <a:prstGeom prst="roundRect">
@@ -3678,7 +4797,7 @@
         </p:nvGrpSpPr>
         <p:grpSpPr>
           <a:xfrm>
-            <a:off x="6046306" y="3128665"/>
+            <a:off x="6046306" y="4102693"/>
             <a:ext cx="1547189" cy="1849924"/>
             <a:chOff x="4946374" y="1577828"/>
             <a:chExt cx="2024270" cy="3200403"/>
@@ -4277,8 +5396,8 @@
         </p:nvSpPr>
         <p:spPr>
           <a:xfrm>
-            <a:off x="5807765" y="1093303"/>
-            <a:ext cx="2024270" cy="1269513"/>
+            <a:off x="5807765" y="2378804"/>
+            <a:ext cx="2024270" cy="958040"/>
           </a:xfrm>
           <a:prstGeom prst="roundRect">
             <a:avLst>
@@ -4339,7 +5458,7 @@
         </p:nvCxnSpPr>
         <p:spPr>
           <a:xfrm>
-            <a:off x="4442791" y="3565409"/>
+            <a:off x="4442791" y="4768040"/>
             <a:ext cx="1603515" cy="0"/>
           </a:xfrm>
           <a:prstGeom prst="straightConnector1">
@@ -4386,7 +5505,7 @@
         </p:nvCxnSpPr>
         <p:spPr>
           <a:xfrm flipH="1">
-            <a:off x="4442791" y="4382073"/>
+            <a:off x="4442791" y="5584704"/>
             <a:ext cx="1591255" cy="0"/>
           </a:xfrm>
           <a:prstGeom prst="straightConnector1">
@@ -4431,8 +5550,8 @@
         </p:nvSpPr>
         <p:spPr>
           <a:xfrm>
-            <a:off x="6061366" y="1536892"/>
-            <a:ext cx="635720" cy="576469"/>
+            <a:off x="6061366" y="2711990"/>
+            <a:ext cx="635720" cy="435033"/>
           </a:xfrm>
           <a:prstGeom prst="roundRect">
             <a:avLst>
@@ -4491,8 +5610,8 @@
         </p:nvSpPr>
         <p:spPr>
           <a:xfrm>
-            <a:off x="6937513" y="1556281"/>
-            <a:ext cx="655982" cy="537690"/>
+            <a:off x="6937513" y="2721863"/>
+            <a:ext cx="655982" cy="405769"/>
           </a:xfrm>
           <a:prstGeom prst="can">
             <a:avLst/>
@@ -4554,7 +5673,7 @@
         </p:nvSpPr>
         <p:spPr>
           <a:xfrm>
-            <a:off x="5794368" y="2608633"/>
+            <a:off x="5794368" y="3582661"/>
             <a:ext cx="681597" cy="307777"/>
           </a:xfrm>
           <a:prstGeom prst="rect">
@@ -4589,7 +5708,7 @@
         </p:nvSpPr>
         <p:spPr>
           <a:xfrm>
-            <a:off x="4832163" y="4084945"/>
+            <a:off x="4832163" y="5287576"/>
             <a:ext cx="795411" cy="307777"/>
           </a:xfrm>
           <a:prstGeom prst="rect">
@@ -4626,7 +5745,7 @@
         </p:nvCxnSpPr>
         <p:spPr>
           <a:xfrm>
-            <a:off x="7123767" y="2385796"/>
+            <a:off x="7123767" y="3359824"/>
             <a:ext cx="0" cy="756943"/>
           </a:xfrm>
           <a:prstGeom prst="straightConnector1">
@@ -4673,7 +5792,7 @@
         </p:nvCxnSpPr>
         <p:spPr>
           <a:xfrm flipV="1">
-            <a:off x="6419808" y="2385796"/>
+            <a:off x="6419808" y="3359824"/>
             <a:ext cx="0" cy="740259"/>
           </a:xfrm>
           <a:prstGeom prst="straightConnector1">
@@ -4718,7 +5837,7 @@
         </p:nvSpPr>
         <p:spPr>
           <a:xfrm>
-            <a:off x="4779157" y="3297273"/>
+            <a:off x="4779157" y="4499904"/>
             <a:ext cx="837089" cy="307777"/>
           </a:xfrm>
           <a:prstGeom prst="rect">
@@ -4753,7 +5872,7 @@
         </p:nvSpPr>
         <p:spPr>
           <a:xfrm>
-            <a:off x="7106334" y="2591852"/>
+            <a:off x="7106334" y="3565880"/>
             <a:ext cx="662874" cy="307777"/>
           </a:xfrm>
           <a:prstGeom prst="rect">
@@ -4788,7 +5907,7 @@
         </p:nvSpPr>
         <p:spPr>
           <a:xfrm>
-            <a:off x="2524538" y="749169"/>
+            <a:off x="2524538" y="1375330"/>
             <a:ext cx="1930493" cy="1254011"/>
           </a:xfrm>
           <a:prstGeom prst="roundRect">
@@ -4848,8 +5967,8 @@
         </p:nvSpPr>
         <p:spPr>
           <a:xfrm>
-            <a:off x="2815073" y="1062679"/>
-            <a:ext cx="1242391" cy="726805"/>
+            <a:off x="2718996" y="1688840"/>
+            <a:ext cx="1515073" cy="726805"/>
           </a:xfrm>
           <a:prstGeom prst="roundRect">
             <a:avLst>
@@ -4890,7 +6009,7 @@
                   <a:schemeClr val="tx1"/>
                 </a:solidFill>
               </a:rPr>
-              <a:t>org.json</a:t>
+              <a:t>townplan.json</a:t>
             </a:r>
             <a:endParaRPr lang="en-US" sz="1400" dirty="0">
               <a:solidFill>
@@ -4946,7 +6065,7 @@
         </p:nvSpPr>
         <p:spPr>
           <a:xfrm>
-            <a:off x="2841271" y="1738177"/>
+            <a:off x="2841271" y="2364338"/>
             <a:ext cx="1229139" cy="168959"/>
           </a:xfrm>
           <a:prstGeom prst="roundRect">
@@ -5016,7 +6135,7 @@
         </p:nvCxnSpPr>
         <p:spPr>
           <a:xfrm flipV="1">
-            <a:off x="3489785" y="2003180"/>
+            <a:off x="3489785" y="2629341"/>
             <a:ext cx="0" cy="471662"/>
           </a:xfrm>
           <a:prstGeom prst="straightConnector1">
@@ -5061,7 +6180,7 @@
         </p:nvSpPr>
         <p:spPr>
           <a:xfrm>
-            <a:off x="2665529" y="2137358"/>
+            <a:off x="2665529" y="2763519"/>
             <a:ext cx="1123897" cy="307777"/>
           </a:xfrm>
           <a:prstGeom prst="rect">
@@ -5082,10 +6201,273 @@
           </a:p>
         </p:txBody>
       </p:sp>
+      <p:sp>
+        <p:nvSpPr>
+          <p:cNvPr id="39" name="Rounded Rectangle 38">
+            <a:extLst>
+              <a:ext uri="{FF2B5EF4-FFF2-40B4-BE49-F238E27FC236}">
+                <a16:creationId xmlns:a16="http://schemas.microsoft.com/office/drawing/2014/main" id="{73F3B62F-7899-2D4A-9AEF-D6991FAB02E6}"/>
+              </a:ext>
+            </a:extLst>
+          </p:cNvPr>
+          <p:cNvSpPr/>
+          <p:nvPr/>
+        </p:nvSpPr>
+        <p:spPr>
+          <a:xfrm>
+            <a:off x="5814700" y="999653"/>
+            <a:ext cx="2024270" cy="841517"/>
+          </a:xfrm>
+          <a:prstGeom prst="roundRect">
+            <a:avLst>
+              <a:gd name="adj" fmla="val 7971"/>
+            </a:avLst>
+          </a:prstGeom>
+          <a:solidFill>
+            <a:schemeClr val="bg1">
+              <a:lumMod val="75000"/>
+            </a:schemeClr>
+          </a:solidFill>
+        </p:spPr>
+        <p:style>
+          <a:lnRef idx="2">
+            <a:schemeClr val="accent1">
+              <a:shade val="50000"/>
+            </a:schemeClr>
+          </a:lnRef>
+          <a:fillRef idx="1">
+            <a:schemeClr val="accent1"/>
+          </a:fillRef>
+          <a:effectRef idx="0">
+            <a:schemeClr val="accent1"/>
+          </a:effectRef>
+          <a:fontRef idx="minor">
+            <a:schemeClr val="lt1"/>
+          </a:fontRef>
+        </p:style>
+        <p:txBody>
+          <a:bodyPr rtlCol="0" anchor="t"/>
+          <a:lstStyle/>
+          <a:p>
+            <a:pPr algn="ctr"/>
+            <a:r>
+              <a:rPr lang="en-US" sz="1400" dirty="0">
+                <a:solidFill>
+                  <a:schemeClr val="tx1"/>
+                </a:solidFill>
+              </a:rPr>
+              <a:t>Other useful outputs</a:t>
+            </a:r>
+          </a:p>
+        </p:txBody>
+      </p:sp>
+      <p:cxnSp>
+        <p:nvCxnSpPr>
+          <p:cNvPr id="40" name="Straight Arrow Connector 39">
+            <a:extLst>
+              <a:ext uri="{FF2B5EF4-FFF2-40B4-BE49-F238E27FC236}">
+                <a16:creationId xmlns:a16="http://schemas.microsoft.com/office/drawing/2014/main" id="{CF9BEE4E-D93B-EC48-90E1-8617CC6C28AA}"/>
+              </a:ext>
+            </a:extLst>
+          </p:cNvPr>
+          <p:cNvCxnSpPr>
+            <a:cxnSpLocks/>
+            <a:stCxn id="35" idx="0"/>
+          </p:cNvCxnSpPr>
+          <p:nvPr/>
+        </p:nvCxnSpPr>
+        <p:spPr>
+          <a:xfrm flipV="1">
+            <a:off x="6819900" y="1841172"/>
+            <a:ext cx="10725" cy="537632"/>
+          </a:xfrm>
+          <a:prstGeom prst="straightConnector1">
+            <a:avLst/>
+          </a:prstGeom>
+          <a:ln w="19050">
+            <a:solidFill>
+              <a:schemeClr val="bg2">
+                <a:lumMod val="25000"/>
+              </a:schemeClr>
+            </a:solidFill>
+            <a:headEnd type="none" w="med" len="med"/>
+            <a:tailEnd type="arrow" w="med" len="med"/>
+          </a:ln>
+        </p:spPr>
+        <p:style>
+          <a:lnRef idx="1">
+            <a:schemeClr val="accent1"/>
+          </a:lnRef>
+          <a:fillRef idx="0">
+            <a:schemeClr val="accent1"/>
+          </a:fillRef>
+          <a:effectRef idx="0">
+            <a:schemeClr val="accent1"/>
+          </a:effectRef>
+          <a:fontRef idx="minor">
+            <a:schemeClr val="tx1"/>
+          </a:fontRef>
+        </p:style>
+      </p:cxnSp>
+      <p:sp>
+        <p:nvSpPr>
+          <p:cNvPr id="46" name="TextBox 45">
+            <a:extLst>
+              <a:ext uri="{FF2B5EF4-FFF2-40B4-BE49-F238E27FC236}">
+                <a16:creationId xmlns:a16="http://schemas.microsoft.com/office/drawing/2014/main" id="{1CC2C544-531D-1A44-ADB0-FF0BE679307F}"/>
+              </a:ext>
+            </a:extLst>
+          </p:cNvPr>
+          <p:cNvSpPr txBox="1"/>
+          <p:nvPr/>
+        </p:nvSpPr>
+        <p:spPr>
+          <a:xfrm>
+            <a:off x="6847359" y="1949370"/>
+            <a:ext cx="834780" cy="307777"/>
+          </a:xfrm>
+          <a:prstGeom prst="rect">
+            <a:avLst/>
+          </a:prstGeom>
+          <a:noFill/>
+        </p:spPr>
+        <p:txBody>
+          <a:bodyPr wrap="none" rtlCol="0">
+            <a:spAutoFit/>
+          </a:bodyPr>
+          <a:lstStyle/>
+          <a:p>
+            <a:r>
+              <a:rPr lang="en-US" sz="1400" dirty="0"/>
+              <a:t>generate</a:t>
+            </a:r>
+          </a:p>
+        </p:txBody>
+      </p:sp>
+      <p:sp>
+        <p:nvSpPr>
+          <p:cNvPr id="47" name="Rounded Rectangle 46">
+            <a:extLst>
+              <a:ext uri="{FF2B5EF4-FFF2-40B4-BE49-F238E27FC236}">
+                <a16:creationId xmlns:a16="http://schemas.microsoft.com/office/drawing/2014/main" id="{40A06D21-7B80-9043-828F-616AB1E607C3}"/>
+              </a:ext>
+            </a:extLst>
+          </p:cNvPr>
+          <p:cNvSpPr/>
+          <p:nvPr/>
+        </p:nvSpPr>
+        <p:spPr>
+          <a:xfrm>
+            <a:off x="5923722" y="1358538"/>
+            <a:ext cx="773364" cy="320520"/>
+          </a:xfrm>
+          <a:prstGeom prst="roundRect">
+            <a:avLst>
+              <a:gd name="adj" fmla="val 7971"/>
+            </a:avLst>
+          </a:prstGeom>
+          <a:solidFill>
+            <a:schemeClr val="bg1">
+              <a:lumMod val="95000"/>
+            </a:schemeClr>
+          </a:solidFill>
+        </p:spPr>
+        <p:style>
+          <a:lnRef idx="2">
+            <a:schemeClr val="accent1">
+              <a:shade val="50000"/>
+            </a:schemeClr>
+          </a:lnRef>
+          <a:fillRef idx="1">
+            <a:schemeClr val="accent1"/>
+          </a:fillRef>
+          <a:effectRef idx="0">
+            <a:schemeClr val="accent1"/>
+          </a:effectRef>
+          <a:fontRef idx="minor">
+            <a:schemeClr val="lt1"/>
+          </a:fontRef>
+        </p:style>
+        <p:txBody>
+          <a:bodyPr rtlCol="0" anchor="ctr"/>
+          <a:lstStyle/>
+          <a:p>
+            <a:pPr algn="ctr"/>
+            <a:r>
+              <a:rPr lang="en-US" sz="1400" dirty="0">
+                <a:solidFill>
+                  <a:schemeClr val="tx1"/>
+                </a:solidFill>
+              </a:rPr>
+              <a:t>Docs</a:t>
+            </a:r>
+          </a:p>
+        </p:txBody>
+      </p:sp>
+      <p:sp>
+        <p:nvSpPr>
+          <p:cNvPr id="48" name="Rounded Rectangle 47">
+            <a:extLst>
+              <a:ext uri="{FF2B5EF4-FFF2-40B4-BE49-F238E27FC236}">
+                <a16:creationId xmlns:a16="http://schemas.microsoft.com/office/drawing/2014/main" id="{03A92F3A-B732-8649-B3C4-6DAE3770C411}"/>
+              </a:ext>
+            </a:extLst>
+          </p:cNvPr>
+          <p:cNvSpPr/>
+          <p:nvPr/>
+        </p:nvSpPr>
+        <p:spPr>
+          <a:xfrm>
+            <a:off x="6830625" y="1360969"/>
+            <a:ext cx="938583" cy="320520"/>
+          </a:xfrm>
+          <a:prstGeom prst="roundRect">
+            <a:avLst>
+              <a:gd name="adj" fmla="val 7971"/>
+            </a:avLst>
+          </a:prstGeom>
+          <a:solidFill>
+            <a:schemeClr val="bg1">
+              <a:lumMod val="95000"/>
+            </a:schemeClr>
+          </a:solidFill>
+        </p:spPr>
+        <p:style>
+          <a:lnRef idx="2">
+            <a:schemeClr val="accent1">
+              <a:shade val="50000"/>
+            </a:schemeClr>
+          </a:lnRef>
+          <a:fillRef idx="1">
+            <a:schemeClr val="accent1"/>
+          </a:fillRef>
+          <a:effectRef idx="0">
+            <a:schemeClr val="accent1"/>
+          </a:effectRef>
+          <a:fontRef idx="minor">
+            <a:schemeClr val="lt1"/>
+          </a:fontRef>
+        </p:style>
+        <p:txBody>
+          <a:bodyPr rtlCol="0" anchor="ctr"/>
+          <a:lstStyle/>
+          <a:p>
+            <a:pPr algn="ctr"/>
+            <a:r>
+              <a:rPr lang="en-US" sz="1400" dirty="0">
+                <a:solidFill>
+                  <a:schemeClr val="tx1"/>
+                </a:solidFill>
+              </a:rPr>
+              <a:t>API Specs</a:t>
+            </a:r>
+          </a:p>
+        </p:txBody>
+      </p:sp>
     </p:spTree>
     <p:extLst>
       <p:ext uri="{BB962C8B-B14F-4D97-AF65-F5344CB8AC3E}">
-        <p14:creationId xmlns:p14="http://schemas.microsoft.com/office/powerpoint/2010/main" val="2858432016"/>
+        <p14:creationId xmlns:p14="http://schemas.microsoft.com/office/powerpoint/2010/main" val="3361575006"/>
       </p:ext>
     </p:extLst>
   </p:cSld>

</xml_diff>